<commit_message>
Find and replace notes in PowerPoint files
</commit_message>
<xml_diff>
--- a/TestFiles/shark.pptx
+++ b/TestFiles/shark.pptx
@@ -111,6 +111,11 @@
       </a:defRPr>
     </a:lvl9pPr>
   </p:defaultTextStyle>
+  <p:extLst>
+    <p:ext uri="{EFAFB233-063F-42B5-8137-9DF3F51BA10A}">
+      <p15:sldGuideLst xmlns:p15="http://schemas.microsoft.com/office/powerpoint/2012/main"/>
+    </p:ext>
+  </p:extLst>
 </p:presentation>
 </file>
 
@@ -1382,7 +1387,7 @@
           <a:p>
             <a:fld id="{7D973874-8DBD-4E72-8929-8F8098291DA6}" type="datetimeFigureOut">
               <a:rPr lang="en-US" smtClean="0"/>
-              <a:t>7/30/2023</a:t>
+              <a:t>8/7/2023</a:t>
             </a:fld>
             <a:endParaRPr lang="en-US"/>
           </a:p>
@@ -1694,8 +1699,93 @@
           <a:lstStyle/>
           <a:p>
             <a:r>
-              <a:rPr lang="en-US" dirty="0"/>
-              <a:t>Whale in the notes</a:t>
+              <a:t>Note about SHARKS</a:t>
+            </a:r>
+          </a:p>
+        </p:txBody>
+      </p:sp>
+      <p:sp>
+        <p:nvSpPr>
+          <p:cNvPr id="4" name="Slide Number Placeholder 3"/>
+          <p:cNvSpPr>
+            <a:spLocks noGrp="1"/>
+          </p:cNvSpPr>
+          <p:nvPr>
+            <p:ph type="sldNum" sz="quarter" idx="5"/>
+          </p:nvPr>
+        </p:nvSpPr>
+        <p:spPr/>
+        <p:txBody>
+          <a:bodyPr/>
+          <a:lstStyle/>
+          <a:p>
+            <a:fld id="{56522F5A-2E4C-4FA3-B0B2-44382ED283B1}" type="slidenum">
+              <a:rPr lang="en-US" smtClean="0"/>
+              <a:t>1</a:t>
+            </a:fld>
+            <a:endParaRPr lang="en-US"/>
+          </a:p>
+        </p:txBody>
+      </p:sp>
+    </p:spTree>
+    <p:extLst>
+      <p:ext uri="{BB962C8B-B14F-4D97-AF65-F5344CB8AC3E}">
+        <p14:creationId xmlns:p14="http://schemas.microsoft.com/office/powerpoint/2010/main" val="3339651133"/>
+      </p:ext>
+    </p:extLst>
+  </p:cSld>
+  <p:clrMapOvr>
+    <a:masterClrMapping/>
+  </p:clrMapOvr>
+</p:notes>
+</file>
+
+<file path=ppt/notesSlides/notesSlide2.xml><?xml version="1.0" encoding="utf-8"?>
+<p:notes xmlns:a="http://schemas.openxmlformats.org/drawingml/2006/main" xmlns:r="http://schemas.openxmlformats.org/officeDocument/2006/relationships" xmlns:p="http://schemas.openxmlformats.org/presentationml/2006/main">
+  <p:cSld>
+    <p:spTree>
+      <p:nvGrpSpPr>
+        <p:cNvPr id="1" name=""/>
+        <p:cNvGrpSpPr/>
+        <p:nvPr/>
+      </p:nvGrpSpPr>
+      <p:grpSpPr>
+        <a:xfrm>
+          <a:off x="0" y="0"/>
+          <a:ext cx="0" cy="0"/>
+          <a:chOff x="0" y="0"/>
+          <a:chExt cx="0" cy="0"/>
+        </a:xfrm>
+      </p:grpSpPr>
+      <p:sp>
+        <p:nvSpPr>
+          <p:cNvPr id="2" name="Slide Image Placeholder 1"/>
+          <p:cNvSpPr>
+            <a:spLocks noGrp="1" noRot="1" noChangeAspect="1"/>
+          </p:cNvSpPr>
+          <p:nvPr>
+            <p:ph type="sldImg"/>
+          </p:nvPr>
+        </p:nvSpPr>
+        <p:spPr/>
+      </p:sp>
+      <p:sp>
+        <p:nvSpPr>
+          <p:cNvPr id="3" name="Notes Placeholder 2"/>
+          <p:cNvSpPr>
+            <a:spLocks noGrp="1"/>
+          </p:cNvSpPr>
+          <p:nvPr>
+            <p:ph type="body" idx="1"/>
+          </p:nvPr>
+        </p:nvSpPr>
+        <p:spPr/>
+        <p:txBody>
+          <a:bodyPr/>
+          <a:lstStyle/>
+          <a:p>
+            <a:r>
+              <a:t>Shark in the notes</a:t>
             </a:r>
           </a:p>
         </p:txBody>
@@ -1883,7 +1973,7 @@
           <a:p>
             <a:fld id="{560BEC06-CFF4-4BA0-A7EA-65D694ACE193}" type="datetimeFigureOut">
               <a:rPr lang="en-US" smtClean="0"/>
-              <a:t>7/30/2023</a:t>
+              <a:t>8/7/2023</a:t>
             </a:fld>
             <a:endParaRPr lang="en-US"/>
           </a:p>
@@ -2081,7 +2171,7 @@
           <a:p>
             <a:fld id="{560BEC06-CFF4-4BA0-A7EA-65D694ACE193}" type="datetimeFigureOut">
               <a:rPr lang="en-US" smtClean="0"/>
-              <a:t>7/30/2023</a:t>
+              <a:t>8/7/2023</a:t>
             </a:fld>
             <a:endParaRPr lang="en-US"/>
           </a:p>
@@ -2289,7 +2379,7 @@
           <a:p>
             <a:fld id="{560BEC06-CFF4-4BA0-A7EA-65D694ACE193}" type="datetimeFigureOut">
               <a:rPr lang="en-US" smtClean="0"/>
-              <a:t>7/30/2023</a:t>
+              <a:t>8/7/2023</a:t>
             </a:fld>
             <a:endParaRPr lang="en-US"/>
           </a:p>
@@ -2487,7 +2577,7 @@
           <a:p>
             <a:fld id="{560BEC06-CFF4-4BA0-A7EA-65D694ACE193}" type="datetimeFigureOut">
               <a:rPr lang="en-US" smtClean="0"/>
-              <a:t>7/30/2023</a:t>
+              <a:t>8/7/2023</a:t>
             </a:fld>
             <a:endParaRPr lang="en-US"/>
           </a:p>
@@ -2762,7 +2852,7 @@
           <a:p>
             <a:fld id="{560BEC06-CFF4-4BA0-A7EA-65D694ACE193}" type="datetimeFigureOut">
               <a:rPr lang="en-US" smtClean="0"/>
-              <a:t>7/30/2023</a:t>
+              <a:t>8/7/2023</a:t>
             </a:fld>
             <a:endParaRPr lang="en-US"/>
           </a:p>
@@ -3027,7 +3117,7 @@
           <a:p>
             <a:fld id="{560BEC06-CFF4-4BA0-A7EA-65D694ACE193}" type="datetimeFigureOut">
               <a:rPr lang="en-US" smtClean="0"/>
-              <a:t>7/30/2023</a:t>
+              <a:t>8/7/2023</a:t>
             </a:fld>
             <a:endParaRPr lang="en-US"/>
           </a:p>
@@ -3439,7 +3529,7 @@
           <a:p>
             <a:fld id="{560BEC06-CFF4-4BA0-A7EA-65D694ACE193}" type="datetimeFigureOut">
               <a:rPr lang="en-US" smtClean="0"/>
-              <a:t>7/30/2023</a:t>
+              <a:t>8/7/2023</a:t>
             </a:fld>
             <a:endParaRPr lang="en-US"/>
           </a:p>
@@ -3580,7 +3670,7 @@
           <a:p>
             <a:fld id="{560BEC06-CFF4-4BA0-A7EA-65D694ACE193}" type="datetimeFigureOut">
               <a:rPr lang="en-US" smtClean="0"/>
-              <a:t>7/30/2023</a:t>
+              <a:t>8/7/2023</a:t>
             </a:fld>
             <a:endParaRPr lang="en-US"/>
           </a:p>
@@ -3693,7 +3783,7 @@
           <a:p>
             <a:fld id="{560BEC06-CFF4-4BA0-A7EA-65D694ACE193}" type="datetimeFigureOut">
               <a:rPr lang="en-US" smtClean="0"/>
-              <a:t>7/30/2023</a:t>
+              <a:t>8/7/2023</a:t>
             </a:fld>
             <a:endParaRPr lang="en-US"/>
           </a:p>
@@ -4004,7 +4094,7 @@
           <a:p>
             <a:fld id="{560BEC06-CFF4-4BA0-A7EA-65D694ACE193}" type="datetimeFigureOut">
               <a:rPr lang="en-US" smtClean="0"/>
-              <a:t>7/30/2023</a:t>
+              <a:t>8/7/2023</a:t>
             </a:fld>
             <a:endParaRPr lang="en-US"/>
           </a:p>
@@ -4292,7 +4382,7 @@
           <a:p>
             <a:fld id="{560BEC06-CFF4-4BA0-A7EA-65D694ACE193}" type="datetimeFigureOut">
               <a:rPr lang="en-US" smtClean="0"/>
-              <a:t>7/30/2023</a:t>
+              <a:t>8/7/2023</a:t>
             </a:fld>
             <a:endParaRPr lang="en-US"/>
           </a:p>
@@ -4533,7 +4623,7 @@
           <a:p>
             <a:fld id="{560BEC06-CFF4-4BA0-A7EA-65D694ACE193}" type="datetimeFigureOut">
               <a:rPr lang="en-US" smtClean="0"/>
-              <a:t>7/30/2023</a:t>
+              <a:t>8/7/2023</a:t>
             </a:fld>
             <a:endParaRPr lang="en-US"/>
           </a:p>
@@ -4973,7 +5063,7 @@
           <a:p>
             <a:r>
               <a:rPr lang="en-US" dirty="0"/>
-              <a:t>WHALES</a:t>
+              <a:t>SHARKS</a:t>
             </a:r>
           </a:p>
         </p:txBody>
@@ -5001,7 +5091,7 @@
           <a:p>
             <a:r>
               <a:rPr lang="en-US" dirty="0"/>
-              <a:t>This is a presentation about whales</a:t>
+              <a:t>This is a presentation about sharks</a:t>
             </a:r>
           </a:p>
         </p:txBody>
@@ -5059,7 +5149,7 @@
           <a:p>
             <a:r>
               <a:rPr lang="en-US" dirty="0"/>
-              <a:t>First slide about whales</a:t>
+              <a:t>First slide about sharks</a:t>
             </a:r>
           </a:p>
         </p:txBody>
@@ -5087,7 +5177,7 @@
           <a:p>
             <a:r>
               <a:rPr lang="en-US" dirty="0"/>
-              <a:t>Point form whale</a:t>
+              <a:t>Point form shark</a:t>
             </a:r>
           </a:p>
           <a:p>
@@ -5100,7 +5190,7 @@
             </a:pPr>
             <a:r>
               <a:rPr lang="en-US" dirty="0"/>
-              <a:t>Whale #1</a:t>
+              <a:t>Shark #1</a:t>
             </a:r>
           </a:p>
           <a:p>
@@ -5110,7 +5200,7 @@
             </a:pPr>
             <a:r>
               <a:rPr lang="en-US" dirty="0"/>
-              <a:t>Whale #2</a:t>
+              <a:t>Shark #2</a:t>
             </a:r>
           </a:p>
           <a:p>
@@ -5120,7 +5210,46 @@
             </a:pPr>
             <a:r>
               <a:rPr lang="en-US" dirty="0"/>
-              <a:t>Whale #3</a:t>
+              <a:t>Shark #3</a:t>
+            </a:r>
+          </a:p>
+          <a:p>
+            <a:pPr marL="0" indent="0">
+              <a:buNone/>
+            </a:pPr>
+            <a:endParaRPr lang="en-US" dirty="0"/>
+          </a:p>
+          <a:p>
+            <a:pPr marL="0" indent="0">
+              <a:buNone/>
+            </a:pPr>
+            <a:r>
+              <a:rPr lang="en-US" dirty="0"/>
+              <a:t>Paragraph about a shark, </a:t>
+            </a:r>
+            <a:r>
+              <a:rPr lang="en-US" b="1" dirty="0"/>
+              <a:t>a bold shark</a:t>
+            </a:r>
+            <a:r>
+              <a:rPr lang="en-US" dirty="0"/>
+              <a:t>, </a:t>
+            </a:r>
+            <a:r>
+              <a:rPr lang="en-US" i="1" dirty="0"/>
+              <a:t>a shark in italics</a:t>
+            </a:r>
+            <a:r>
+              <a:rPr lang="en-US" dirty="0"/>
+              <a:t>, and then </a:t>
+            </a:r>
+            <a:r>
+              <a:rPr lang="en-US" u="sng" dirty="0"/>
+              <a:t>an underlined shark</a:t>
+            </a:r>
+            <a:r>
+              <a:rPr lang="en-US" dirty="0"/>
+              <a:t>. Text should be replaced while keeping formatting.</a:t>
             </a:r>
           </a:p>
         </p:txBody>
@@ -5168,7 +5297,7 @@
           <a:p>
             <a:r>
               <a:rPr lang="en-US" dirty="0"/>
-              <a:t>Whale in text box</a:t>
+              <a:t>Shark in text box</a:t>
             </a:r>
           </a:p>
         </p:txBody>
@@ -5226,7 +5355,7 @@
           <a:p>
             <a:r>
               <a:rPr lang="en-US" dirty="0"/>
-              <a:t>Whale in the footer</a:t>
+              <a:t>Shark in the footer</a:t>
             </a:r>
           </a:p>
         </p:txBody>
@@ -5275,7 +5404,7 @@
             <a:pPr algn="ctr"/>
             <a:r>
               <a:rPr lang="en-US" dirty="0"/>
-              <a:t>Whale in a square</a:t>
+              <a:t>Shark in a square</a:t>
             </a:r>
           </a:p>
         </p:txBody>
@@ -5332,7 +5461,7 @@
                   </a:outerShdw>
                 </a:effectLst>
               </a:rPr>
-              <a:t>Whale in a star!</a:t>
+              <a:t>Shark in a star!</a:t>
             </a:r>
           </a:p>
         </p:txBody>
@@ -5386,7 +5515,7 @@
                   </a:outerShdw>
                 </a:effectLst>
               </a:rPr>
-              <a:t>Whale Word Art</a:t>
+              <a:t>Shark Word Art</a:t>
             </a:r>
           </a:p>
         </p:txBody>
@@ -5532,8 +5661,7 @@
                     <a:lstStyle/>
                     <a:p>
                       <a:r>
-                        <a:rPr lang="en-US" dirty="0"/>
-                        <a:t>Whale table</a:t>
+                        <a:t>Shark table</a:t>
                       </a:r>
                     </a:p>
                   </a:txBody>
@@ -5545,22 +5673,8 @@
                     <a:lstStyle/>
                     <a:p>
                       <a:r>
-                        <a:rPr lang="en-US" dirty="0"/>
-                        <a:t>Whale </a:t>
+                        <a:t>Shark shark shark</a:t>
                       </a:r>
-                      <a:r>
-                        <a:rPr lang="en-US" dirty="0" err="1"/>
-                        <a:t>whale</a:t>
-                      </a:r>
-                      <a:r>
-                        <a:rPr lang="en-US" dirty="0"/>
-                        <a:t> </a:t>
-                      </a:r>
-                      <a:r>
-                        <a:rPr lang="en-US" dirty="0" err="1"/>
-                        <a:t>whale</a:t>
-                      </a:r>
-                      <a:endParaRPr lang="en-US" dirty="0"/>
                     </a:p>
                   </a:txBody>
                   <a:tcPr/>
@@ -5578,8 +5692,7 @@
                     <a:lstStyle/>
                     <a:p>
                       <a:r>
-                        <a:rPr lang="en-US" dirty="0"/>
-                        <a:t>Here’s some info about whales</a:t>
+                        <a:t>Here’s some info about sharks</a:t>
                       </a:r>
                     </a:p>
                   </a:txBody>
@@ -5591,8 +5704,7 @@
                     <a:lstStyle/>
                     <a:p>
                       <a:r>
-                        <a:rPr lang="en-US" dirty="0"/>
-                        <a:t>More info about whales</a:t>
+                        <a:t>More info about sharks</a:t>
                       </a:r>
                     </a:p>
                   </a:txBody>

</xml_diff>